<commit_message>
Remove slice label from image
</commit_message>
<xml_diff>
--- a/figures/resources/binarization.pptx
+++ b/figures/resources/binarization.pptx
@@ -8668,7 +8668,7 @@
         </p:blipFill>
         <p:spPr>
           <a:xfrm>
-            <a:off x="5745020" y="8186144"/>
+            <a:off x="5215860" y="8186144"/>
             <a:ext cx="4113213" cy="2233666"/>
           </a:xfrm>
           <a:prstGeom prst="rect">
@@ -8688,7 +8688,7 @@
         </p:nvSpPr>
         <p:spPr>
           <a:xfrm>
-            <a:off x="10243701" y="4920507"/>
+            <a:off x="10040499" y="4920507"/>
             <a:ext cx="2397989" cy="1565354"/>
           </a:xfrm>
           <a:prstGeom prst="roundRect">

</xml_diff>